<commit_message>
Edits to fd overwrite slides
</commit_message>
<xml_diff>
--- a/challenges/fake_chunks/FdOverwrite.pptx
+++ b/challenges/fake_chunks/FdOverwrite.pptx
@@ -5,7 +5,7 @@
     <p:sldMasterId id="2147483660" r:id="rId1"/>
   </p:sldMasterIdLst>
   <p:notesMasterIdLst>
-    <p:notesMasterId r:id="rId45"/>
+    <p:notesMasterId r:id="rId53"/>
   </p:notesMasterIdLst>
   <p:sldIdLst>
     <p:sldId id="327" r:id="rId2"/>
@@ -28,29 +28,37 @@
     <p:sldId id="454" r:id="rId19"/>
     <p:sldId id="447" r:id="rId20"/>
     <p:sldId id="446" r:id="rId21"/>
-    <p:sldId id="456" r:id="rId22"/>
-    <p:sldId id="455" r:id="rId23"/>
-    <p:sldId id="457" r:id="rId24"/>
-    <p:sldId id="458" r:id="rId25"/>
-    <p:sldId id="459" r:id="rId26"/>
-    <p:sldId id="463" r:id="rId27"/>
-    <p:sldId id="461" r:id="rId28"/>
-    <p:sldId id="462" r:id="rId29"/>
-    <p:sldId id="460" r:id="rId30"/>
-    <p:sldId id="464" r:id="rId31"/>
-    <p:sldId id="466" r:id="rId32"/>
-    <p:sldId id="465" r:id="rId33"/>
-    <p:sldId id="467" r:id="rId34"/>
-    <p:sldId id="468" r:id="rId35"/>
-    <p:sldId id="469" r:id="rId36"/>
-    <p:sldId id="470" r:id="rId37"/>
-    <p:sldId id="471" r:id="rId38"/>
-    <p:sldId id="473" r:id="rId39"/>
-    <p:sldId id="472" r:id="rId40"/>
-    <p:sldId id="474" r:id="rId41"/>
-    <p:sldId id="475" r:id="rId42"/>
-    <p:sldId id="484" r:id="rId43"/>
-    <p:sldId id="491" r:id="rId44"/>
+    <p:sldId id="492" r:id="rId22"/>
+    <p:sldId id="499" r:id="rId23"/>
+    <p:sldId id="493" r:id="rId24"/>
+    <p:sldId id="494" r:id="rId25"/>
+    <p:sldId id="495" r:id="rId26"/>
+    <p:sldId id="497" r:id="rId27"/>
+    <p:sldId id="498" r:id="rId28"/>
+    <p:sldId id="500" r:id="rId29"/>
+    <p:sldId id="456" r:id="rId30"/>
+    <p:sldId id="455" r:id="rId31"/>
+    <p:sldId id="457" r:id="rId32"/>
+    <p:sldId id="458" r:id="rId33"/>
+    <p:sldId id="459" r:id="rId34"/>
+    <p:sldId id="463" r:id="rId35"/>
+    <p:sldId id="461" r:id="rId36"/>
+    <p:sldId id="462" r:id="rId37"/>
+    <p:sldId id="460" r:id="rId38"/>
+    <p:sldId id="464" r:id="rId39"/>
+    <p:sldId id="466" r:id="rId40"/>
+    <p:sldId id="465" r:id="rId41"/>
+    <p:sldId id="467" r:id="rId42"/>
+    <p:sldId id="468" r:id="rId43"/>
+    <p:sldId id="469" r:id="rId44"/>
+    <p:sldId id="470" r:id="rId45"/>
+    <p:sldId id="471" r:id="rId46"/>
+    <p:sldId id="473" r:id="rId47"/>
+    <p:sldId id="472" r:id="rId48"/>
+    <p:sldId id="474" r:id="rId49"/>
+    <p:sldId id="475" r:id="rId50"/>
+    <p:sldId id="484" r:id="rId51"/>
+    <p:sldId id="491" r:id="rId52"/>
   </p:sldIdLst>
   <p:sldSz cx="9144000" cy="5143500" type="screen16x9"/>
   <p:notesSz cx="6858000" cy="9144000"/>
@@ -14916,7 +14924,7 @@
           <a:p>
             <a:fld id="{2DA23E8D-1792-1541-9147-970A8DD8A355}" type="datetimeFigureOut">
               <a:rPr lang="en-US" smtClean="0"/>
-              <a:t>1/31/21</a:t>
+              <a:t>2/11/21</a:t>
             </a:fld>
             <a:endParaRPr lang="en-US" dirty="0"/>
           </a:p>
@@ -15386,7 +15394,7 @@
                 <a:latin typeface="Calibri"/>
               </a:rPr>
               <a:pPr/>
-              <a:t>1/31/21</a:t>
+              <a:t>2/11/21</a:t>
             </a:fld>
             <a:endParaRPr lang="en-US" dirty="0">
               <a:solidFill>
@@ -15639,7 +15647,7 @@
                 <a:latin typeface="Calibri"/>
               </a:rPr>
               <a:pPr/>
-              <a:t>1/31/21</a:t>
+              <a:t>2/11/21</a:t>
             </a:fld>
             <a:endParaRPr lang="en-US" dirty="0">
               <a:solidFill>
@@ -15854,7 +15862,7 @@
                 <a:latin typeface="Calibri"/>
               </a:rPr>
               <a:pPr/>
-              <a:t>1/31/21</a:t>
+              <a:t>2/11/21</a:t>
             </a:fld>
             <a:endParaRPr lang="en-US" dirty="0">
               <a:solidFill>
@@ -16252,7 +16260,7 @@
                 <a:latin typeface="Calibri"/>
               </a:rPr>
               <a:pPr/>
-              <a:t>1/31/21</a:t>
+              <a:t>2/11/21</a:t>
             </a:fld>
             <a:endParaRPr lang="en-US" dirty="0">
               <a:solidFill>
@@ -16594,7 +16602,7 @@
                 <a:latin typeface="Calibri"/>
               </a:rPr>
               <a:pPr/>
-              <a:t>1/31/21</a:t>
+              <a:t>2/11/21</a:t>
             </a:fld>
             <a:endParaRPr lang="en-US" dirty="0">
               <a:solidFill>
@@ -16922,7 +16930,7 @@
                 <a:latin typeface="Calibri"/>
               </a:rPr>
               <a:pPr/>
-              <a:t>1/31/21</a:t>
+              <a:t>2/11/21</a:t>
             </a:fld>
             <a:endParaRPr lang="en-US" dirty="0">
               <a:solidFill>
@@ -17411,7 +17419,7 @@
                 <a:latin typeface="Calibri"/>
               </a:rPr>
               <a:pPr/>
-              <a:t>1/31/21</a:t>
+              <a:t>2/11/21</a:t>
             </a:fld>
             <a:endParaRPr lang="en-US" dirty="0">
               <a:solidFill>
@@ -17594,7 +17602,7 @@
                 <a:latin typeface="Calibri"/>
               </a:rPr>
               <a:pPr/>
-              <a:t>1/31/21</a:t>
+              <a:t>2/11/21</a:t>
             </a:fld>
             <a:endParaRPr lang="en-US" dirty="0">
               <a:solidFill>
@@ -17840,7 +17848,7 @@
                 <a:latin typeface="Calibri"/>
               </a:rPr>
               <a:pPr/>
-              <a:t>1/31/21</a:t>
+              <a:t>2/11/21</a:t>
             </a:fld>
             <a:endParaRPr lang="en-US" dirty="0">
               <a:solidFill>
@@ -18182,7 +18190,7 @@
                 <a:latin typeface="Calibri"/>
               </a:rPr>
               <a:pPr/>
-              <a:t>1/31/21</a:t>
+              <a:t>2/11/21</a:t>
             </a:fld>
             <a:endParaRPr lang="en-US" dirty="0">
               <a:solidFill>
@@ -18474,7 +18482,7 @@
                 <a:latin typeface="Calibri"/>
               </a:rPr>
               <a:pPr/>
-              <a:t>1/31/21</a:t>
+              <a:t>2/11/21</a:t>
             </a:fld>
             <a:endParaRPr lang="en-US" dirty="0">
               <a:solidFill>
@@ -18724,7 +18732,7 @@
                 <a:latin typeface="Calibri"/>
               </a:rPr>
               <a:pPr defTabSz="914400"/>
-              <a:t>1/31/21</a:t>
+              <a:t>2/11/21</a:t>
             </a:fld>
             <a:endParaRPr lang="en-US" dirty="0">
               <a:solidFill>
@@ -21246,6 +21254,13 @@
             </a:r>
           </a:p>
           <a:p>
+            <a:pPr lvl="1"/>
+            <a:r>
+              <a:rPr lang="en-US" dirty="0"/>
+              <a:t>Cleared up being allocated</a:t>
+            </a:r>
+          </a:p>
+          <a:p>
             <a:r>
               <a:rPr lang="en-US" dirty="0"/>
               <a:t>A use-after-free read on </a:t>
@@ -21785,6 +21800,1200 @@
           <p:cNvPr id="2" name="Title 1">
             <a:extLst>
               <a:ext uri="{FF2B5EF4-FFF2-40B4-BE49-F238E27FC236}">
+                <a16:creationId xmlns:a16="http://schemas.microsoft.com/office/drawing/2014/main" id="{866ACC8C-7B4D-9A4D-9BCB-4EE61B5A1635}"/>
+              </a:ext>
+            </a:extLst>
+          </p:cNvPr>
+          <p:cNvSpPr>
+            <a:spLocks noGrp="1"/>
+          </p:cNvSpPr>
+          <p:nvPr>
+            <p:ph type="title"/>
+          </p:nvPr>
+        </p:nvSpPr>
+        <p:spPr/>
+        <p:txBody>
+          <a:bodyPr/>
+          <a:lstStyle/>
+          <a:p>
+            <a:r>
+              <a:rPr lang="en-US" dirty="0"/>
+              <a:t>Challenge 1</a:t>
+            </a:r>
+          </a:p>
+        </p:txBody>
+      </p:sp>
+      <p:sp>
+        <p:nvSpPr>
+          <p:cNvPr id="3" name="Content Placeholder 2">
+            <a:extLst>
+              <a:ext uri="{FF2B5EF4-FFF2-40B4-BE49-F238E27FC236}">
+                <a16:creationId xmlns:a16="http://schemas.microsoft.com/office/drawing/2014/main" id="{A9B74886-7FA9-6045-94CE-4AC2E77B423D}"/>
+              </a:ext>
+            </a:extLst>
+          </p:cNvPr>
+          <p:cNvSpPr>
+            <a:spLocks noGrp="1"/>
+          </p:cNvSpPr>
+          <p:nvPr>
+            <p:ph idx="1"/>
+          </p:nvPr>
+        </p:nvSpPr>
+        <p:spPr/>
+        <p:txBody>
+          <a:bodyPr/>
+          <a:lstStyle/>
+          <a:p>
+            <a:r>
+              <a:rPr lang="en-US" dirty="0" err="1"/>
+              <a:t>fd_poision</a:t>
+            </a:r>
+            <a:r>
+              <a:rPr lang="en-US" dirty="0"/>
+              <a:t>-&gt;challenge1</a:t>
+            </a:r>
+          </a:p>
+          <a:p>
+            <a:r>
+              <a:rPr lang="en-US" dirty="0"/>
+              <a:t>Setup a fake chunk to overwrite a string</a:t>
+            </a:r>
+          </a:p>
+          <a:p>
+            <a:r>
+              <a:rPr lang="en-US" dirty="0"/>
+              <a:t>String is at ﻿</a:t>
+            </a:r>
+            <a:r>
+              <a:rPr lang="en-US" b="1" dirty="0"/>
+              <a:t>0x601080</a:t>
+            </a:r>
+          </a:p>
+        </p:txBody>
+      </p:sp>
+    </p:spTree>
+    <p:extLst>
+      <p:ext uri="{BB962C8B-B14F-4D97-AF65-F5344CB8AC3E}">
+        <p14:creationId xmlns:p14="http://schemas.microsoft.com/office/powerpoint/2010/main" val="3704577192"/>
+      </p:ext>
+    </p:extLst>
+  </p:cSld>
+  <p:clrMapOvr>
+    <a:masterClrMapping/>
+  </p:clrMapOvr>
+</p:sld>
+</file>
+
+<file path=ppt/slides/slide22.xml><?xml version="1.0" encoding="utf-8"?>
+<p:sld xmlns:a="http://schemas.openxmlformats.org/drawingml/2006/main" xmlns:r="http://schemas.openxmlformats.org/officeDocument/2006/relationships" xmlns:p="http://schemas.openxmlformats.org/presentationml/2006/main">
+  <p:cSld>
+    <p:spTree>
+      <p:nvGrpSpPr>
+        <p:cNvPr id="1" name=""/>
+        <p:cNvGrpSpPr/>
+        <p:nvPr/>
+      </p:nvGrpSpPr>
+      <p:grpSpPr>
+        <a:xfrm>
+          <a:off x="0" y="0"/>
+          <a:ext cx="0" cy="0"/>
+          <a:chOff x="0" y="0"/>
+          <a:chExt cx="0" cy="0"/>
+        </a:xfrm>
+      </p:grpSpPr>
+      <p:sp>
+        <p:nvSpPr>
+          <p:cNvPr id="2" name="Title 1">
+            <a:extLst>
+              <a:ext uri="{FF2B5EF4-FFF2-40B4-BE49-F238E27FC236}">
+                <a16:creationId xmlns:a16="http://schemas.microsoft.com/office/drawing/2014/main" id="{0DC0409E-33C4-1B4D-9536-E0B7126C7E32}"/>
+              </a:ext>
+            </a:extLst>
+          </p:cNvPr>
+          <p:cNvSpPr>
+            <a:spLocks noGrp="1"/>
+          </p:cNvSpPr>
+          <p:nvPr>
+            <p:ph type="title"/>
+          </p:nvPr>
+        </p:nvSpPr>
+        <p:spPr/>
+        <p:txBody>
+          <a:bodyPr/>
+          <a:lstStyle/>
+          <a:p>
+            <a:r>
+              <a:rPr lang="en-US" dirty="0"/>
+              <a:t>Debugging Tips - Commands</a:t>
+            </a:r>
+          </a:p>
+        </p:txBody>
+      </p:sp>
+      <p:sp>
+        <p:nvSpPr>
+          <p:cNvPr id="3" name="Content Placeholder 2">
+            <a:extLst>
+              <a:ext uri="{FF2B5EF4-FFF2-40B4-BE49-F238E27FC236}">
+                <a16:creationId xmlns:a16="http://schemas.microsoft.com/office/drawing/2014/main" id="{9979A9B1-889A-EA45-88AD-18911539E0C4}"/>
+              </a:ext>
+            </a:extLst>
+          </p:cNvPr>
+          <p:cNvSpPr>
+            <a:spLocks noGrp="1"/>
+          </p:cNvSpPr>
+          <p:nvPr>
+            <p:ph idx="1"/>
+          </p:nvPr>
+        </p:nvSpPr>
+        <p:spPr>
+          <a:xfrm>
+            <a:off x="628650" y="1236541"/>
+            <a:ext cx="7886700" cy="3805722"/>
+          </a:xfrm>
+        </p:spPr>
+        <p:txBody>
+          <a:bodyPr>
+            <a:normAutofit fontScale="85000" lnSpcReduction="20000"/>
+          </a:bodyPr>
+          <a:lstStyle/>
+          <a:p>
+            <a:r>
+              <a:rPr lang="en-US" dirty="0"/>
+              <a:t>breakpoint  *malloc: </a:t>
+            </a:r>
+          </a:p>
+          <a:p>
+            <a:pPr lvl="1"/>
+            <a:r>
+              <a:rPr lang="en-US" dirty="0"/>
+              <a:t>Set a breakpoint at </a:t>
+            </a:r>
+            <a:r>
+              <a:rPr lang="en-US" b="1" dirty="0"/>
+              <a:t>malloc</a:t>
+            </a:r>
+          </a:p>
+          <a:p>
+            <a:pPr lvl="1"/>
+            <a:r>
+              <a:rPr lang="en-US" dirty="0"/>
+              <a:t>Look at what happens step by step</a:t>
+            </a:r>
+          </a:p>
+          <a:p>
+            <a:r>
+              <a:rPr lang="en-US" dirty="0"/>
+              <a:t>breakpoint *free: </a:t>
+            </a:r>
+          </a:p>
+          <a:p>
+            <a:pPr lvl="1"/>
+            <a:r>
+              <a:rPr lang="en-US" dirty="0"/>
+              <a:t>Set a breakpoint on </a:t>
+            </a:r>
+            <a:r>
+              <a:rPr lang="en-US" b="1" dirty="0"/>
+              <a:t>free</a:t>
+            </a:r>
+          </a:p>
+          <a:p>
+            <a:r>
+              <a:rPr lang="en-US" dirty="0"/>
+              <a:t>step (s): </a:t>
+            </a:r>
+          </a:p>
+          <a:p>
+            <a:pPr lvl="1"/>
+            <a:r>
+              <a:rPr lang="en-US" dirty="0"/>
+              <a:t>Step line by line</a:t>
+            </a:r>
+          </a:p>
+          <a:p>
+            <a:r>
+              <a:rPr lang="en-US" dirty="0"/>
+              <a:t>continue (c):</a:t>
+            </a:r>
+          </a:p>
+          <a:p>
+            <a:pPr lvl="1"/>
+            <a:r>
+              <a:rPr lang="en-US" dirty="0"/>
+              <a:t>Continue until next breakpoint</a:t>
+            </a:r>
+          </a:p>
+          <a:p>
+            <a:r>
+              <a:rPr lang="en-US" dirty="0"/>
+              <a:t>bins:</a:t>
+            </a:r>
+          </a:p>
+          <a:p>
+            <a:pPr lvl="1"/>
+            <a:r>
+              <a:rPr lang="en-US" dirty="0"/>
+              <a:t>View data in all of the bins</a:t>
+            </a:r>
+          </a:p>
+          <a:p>
+            <a:r>
+              <a:rPr lang="en-US" dirty="0" err="1"/>
+              <a:t>tcache</a:t>
+            </a:r>
+            <a:r>
+              <a:rPr lang="en-US" dirty="0"/>
+              <a:t>: </a:t>
+            </a:r>
+          </a:p>
+          <a:p>
+            <a:pPr lvl="1"/>
+            <a:r>
+              <a:rPr lang="en-US" dirty="0"/>
+              <a:t>Specifically show the </a:t>
+            </a:r>
+            <a:r>
+              <a:rPr lang="en-US" i="1" dirty="0" err="1"/>
+              <a:t>tcache</a:t>
+            </a:r>
+            <a:r>
+              <a:rPr lang="en-US" dirty="0"/>
+              <a:t> </a:t>
+            </a:r>
+            <a:r>
+              <a:rPr lang="en-US" i="1" dirty="0"/>
+              <a:t>bin</a:t>
+            </a:r>
+            <a:r>
+              <a:rPr lang="en-US" dirty="0"/>
+              <a:t> only</a:t>
+            </a:r>
+          </a:p>
+        </p:txBody>
+      </p:sp>
+    </p:spTree>
+    <p:extLst>
+      <p:ext uri="{BB962C8B-B14F-4D97-AF65-F5344CB8AC3E}">
+        <p14:creationId xmlns:p14="http://schemas.microsoft.com/office/powerpoint/2010/main" val="923231449"/>
+      </p:ext>
+    </p:extLst>
+  </p:cSld>
+  <p:clrMapOvr>
+    <a:masterClrMapping/>
+  </p:clrMapOvr>
+</p:sld>
+</file>
+
+<file path=ppt/slides/slide23.xml><?xml version="1.0" encoding="utf-8"?>
+<p:sld xmlns:a="http://schemas.openxmlformats.org/drawingml/2006/main" xmlns:r="http://schemas.openxmlformats.org/officeDocument/2006/relationships" xmlns:p="http://schemas.openxmlformats.org/presentationml/2006/main">
+  <p:cSld>
+    <p:spTree>
+      <p:nvGrpSpPr>
+        <p:cNvPr id="1" name=""/>
+        <p:cNvGrpSpPr/>
+        <p:nvPr/>
+      </p:nvGrpSpPr>
+      <p:grpSpPr>
+        <a:xfrm>
+          <a:off x="0" y="0"/>
+          <a:ext cx="0" cy="0"/>
+          <a:chOff x="0" y="0"/>
+          <a:chExt cx="0" cy="0"/>
+        </a:xfrm>
+      </p:grpSpPr>
+      <p:sp>
+        <p:nvSpPr>
+          <p:cNvPr id="10" name="Title 1">
+            <a:extLst>
+              <a:ext uri="{FF2B5EF4-FFF2-40B4-BE49-F238E27FC236}">
+                <a16:creationId xmlns:a16="http://schemas.microsoft.com/office/drawing/2014/main" id="{01F3E129-263E-46B0-A80D-3F1DB5FAC883}"/>
+              </a:ext>
+            </a:extLst>
+          </p:cNvPr>
+          <p:cNvSpPr>
+            <a:spLocks noGrp="1"/>
+          </p:cNvSpPr>
+          <p:nvPr>
+            <p:ph type="title"/>
+          </p:nvPr>
+        </p:nvSpPr>
+        <p:spPr>
+          <a:xfrm>
+            <a:off x="629841" y="342900"/>
+            <a:ext cx="2949178" cy="1200150"/>
+          </a:xfrm>
+        </p:spPr>
+        <p:txBody>
+          <a:bodyPr/>
+          <a:lstStyle/>
+          <a:p>
+            <a:r>
+              <a:rPr lang="en-US" dirty="0"/>
+              <a:t>After First Malloc</a:t>
+            </a:r>
+          </a:p>
+        </p:txBody>
+      </p:sp>
+      <p:pic>
+        <p:nvPicPr>
+          <p:cNvPr id="5" name="Content Placeholder 4" descr="Box and whisker chart&#10;&#10;Description automatically generated with medium confidence">
+            <a:extLst>
+              <a:ext uri="{FF2B5EF4-FFF2-40B4-BE49-F238E27FC236}">
+                <a16:creationId xmlns:a16="http://schemas.microsoft.com/office/drawing/2014/main" id="{F1EED908-76EF-0C48-AD54-B6E21F754A45}"/>
+              </a:ext>
+            </a:extLst>
+          </p:cNvPr>
+          <p:cNvPicPr>
+            <a:picLocks noGrp="1" noChangeAspect="1"/>
+          </p:cNvPicPr>
+          <p:nvPr>
+            <p:ph idx="1"/>
+          </p:nvPr>
+        </p:nvPicPr>
+        <p:blipFill>
+          <a:blip r:embed="rId2"/>
+          <a:stretch>
+            <a:fillRect/>
+          </a:stretch>
+        </p:blipFill>
+        <p:spPr>
+          <a:xfrm>
+            <a:off x="4755469" y="740572"/>
+            <a:ext cx="2892993" cy="3655219"/>
+          </a:xfrm>
+          <a:noFill/>
+        </p:spPr>
+      </p:pic>
+      <p:sp>
+        <p:nvSpPr>
+          <p:cNvPr id="12" name="Text Placeholder 3">
+            <a:extLst>
+              <a:ext uri="{FF2B5EF4-FFF2-40B4-BE49-F238E27FC236}">
+                <a16:creationId xmlns:a16="http://schemas.microsoft.com/office/drawing/2014/main" id="{DFC6264D-0BA4-4D81-9905-8B2BFF0425FA}"/>
+              </a:ext>
+            </a:extLst>
+          </p:cNvPr>
+          <p:cNvSpPr>
+            <a:spLocks noGrp="1"/>
+          </p:cNvSpPr>
+          <p:nvPr>
+            <p:ph type="body" sz="half" idx="2"/>
+          </p:nvPr>
+        </p:nvSpPr>
+        <p:spPr>
+          <a:xfrm>
+            <a:off x="3050438" y="3195641"/>
+            <a:ext cx="1479874" cy="1200150"/>
+          </a:xfrm>
+        </p:spPr>
+        <p:txBody>
+          <a:bodyPr/>
+          <a:lstStyle/>
+          <a:p>
+            <a:r>
+              <a:rPr lang="en-US" dirty="0"/>
+              <a:t>We control this via a UAF!</a:t>
+            </a:r>
+          </a:p>
+        </p:txBody>
+      </p:sp>
+      <p:cxnSp>
+        <p:nvCxnSpPr>
+          <p:cNvPr id="9" name="Straight Arrow Connector 8">
+            <a:extLst>
+              <a:ext uri="{FF2B5EF4-FFF2-40B4-BE49-F238E27FC236}">
+                <a16:creationId xmlns:a16="http://schemas.microsoft.com/office/drawing/2014/main" id="{A13F9F48-B26D-A64C-A21E-0FFFB0B807DA}"/>
+              </a:ext>
+            </a:extLst>
+          </p:cNvPr>
+          <p:cNvCxnSpPr>
+            <a:cxnSpLocks/>
+          </p:cNvCxnSpPr>
+          <p:nvPr/>
+        </p:nvCxnSpPr>
+        <p:spPr>
+          <a:xfrm>
+            <a:off x="3050438" y="3716122"/>
+            <a:ext cx="1617249" cy="0"/>
+          </a:xfrm>
+          <a:prstGeom prst="straightConnector1">
+            <a:avLst/>
+          </a:prstGeom>
+          <a:ln w="76200">
+            <a:solidFill>
+              <a:srgbClr val="FF0000"/>
+            </a:solidFill>
+            <a:tailEnd type="triangle"/>
+          </a:ln>
+        </p:spPr>
+        <p:style>
+          <a:lnRef idx="1">
+            <a:schemeClr val="accent1"/>
+          </a:lnRef>
+          <a:fillRef idx="0">
+            <a:schemeClr val="accent1"/>
+          </a:fillRef>
+          <a:effectRef idx="0">
+            <a:schemeClr val="accent1"/>
+          </a:effectRef>
+          <a:fontRef idx="minor">
+            <a:schemeClr val="tx1"/>
+          </a:fontRef>
+        </p:style>
+      </p:cxnSp>
+    </p:spTree>
+    <p:extLst>
+      <p:ext uri="{BB962C8B-B14F-4D97-AF65-F5344CB8AC3E}">
+        <p14:creationId xmlns:p14="http://schemas.microsoft.com/office/powerpoint/2010/main" val="3387850238"/>
+      </p:ext>
+    </p:extLst>
+  </p:cSld>
+  <p:clrMapOvr>
+    <a:masterClrMapping/>
+  </p:clrMapOvr>
+</p:sld>
+</file>
+
+<file path=ppt/slides/slide24.xml><?xml version="1.0" encoding="utf-8"?>
+<p:sld xmlns:a="http://schemas.openxmlformats.org/drawingml/2006/main" xmlns:r="http://schemas.openxmlformats.org/officeDocument/2006/relationships" xmlns:p="http://schemas.openxmlformats.org/presentationml/2006/main">
+  <p:cSld>
+    <p:spTree>
+      <p:nvGrpSpPr>
+        <p:cNvPr id="1" name=""/>
+        <p:cNvGrpSpPr/>
+        <p:nvPr/>
+      </p:nvGrpSpPr>
+      <p:grpSpPr>
+        <a:xfrm>
+          <a:off x="0" y="0"/>
+          <a:ext cx="0" cy="0"/>
+          <a:chOff x="0" y="0"/>
+          <a:chExt cx="0" cy="0"/>
+        </a:xfrm>
+      </p:grpSpPr>
+      <p:sp>
+        <p:nvSpPr>
+          <p:cNvPr id="10" name="Title 1">
+            <a:extLst>
+              <a:ext uri="{FF2B5EF4-FFF2-40B4-BE49-F238E27FC236}">
+                <a16:creationId xmlns:a16="http://schemas.microsoft.com/office/drawing/2014/main" id="{01F3E129-263E-46B0-A80D-3F1DB5FAC883}"/>
+              </a:ext>
+            </a:extLst>
+          </p:cNvPr>
+          <p:cNvSpPr>
+            <a:spLocks noGrp="1"/>
+          </p:cNvSpPr>
+          <p:nvPr>
+            <p:ph type="title"/>
+          </p:nvPr>
+        </p:nvSpPr>
+        <p:spPr>
+          <a:xfrm>
+            <a:off x="629841" y="342900"/>
+            <a:ext cx="2949178" cy="1200150"/>
+          </a:xfrm>
+        </p:spPr>
+        <p:txBody>
+          <a:bodyPr/>
+          <a:lstStyle/>
+          <a:p>
+            <a:r>
+              <a:rPr lang="en-US" dirty="0"/>
+              <a:t>Controlling Fd Pointer</a:t>
+            </a:r>
+          </a:p>
+        </p:txBody>
+      </p:sp>
+      <p:sp>
+        <p:nvSpPr>
+          <p:cNvPr id="12" name="Text Placeholder 3">
+            <a:extLst>
+              <a:ext uri="{FF2B5EF4-FFF2-40B4-BE49-F238E27FC236}">
+                <a16:creationId xmlns:a16="http://schemas.microsoft.com/office/drawing/2014/main" id="{DFC6264D-0BA4-4D81-9905-8B2BFF0425FA}"/>
+              </a:ext>
+            </a:extLst>
+          </p:cNvPr>
+          <p:cNvSpPr>
+            <a:spLocks noGrp="1"/>
+          </p:cNvSpPr>
+          <p:nvPr>
+            <p:ph type="body" sz="half" idx="2"/>
+          </p:nvPr>
+        </p:nvSpPr>
+        <p:spPr>
+          <a:xfrm>
+            <a:off x="760082" y="1787750"/>
+            <a:ext cx="3385197" cy="1930809"/>
+          </a:xfrm>
+        </p:spPr>
+        <p:txBody>
+          <a:bodyPr/>
+          <a:lstStyle/>
+          <a:p>
+            <a:pPr marL="285750" indent="-285750">
+              <a:buFont typeface="Arial" panose="020B0604020202020204" pitchFamily="34" charset="0"/>
+              <a:buChar char="•"/>
+            </a:pPr>
+            <a:r>
+              <a:rPr lang="en-US" dirty="0"/>
+              <a:t>We control a chunk in the bin!</a:t>
+            </a:r>
+          </a:p>
+          <a:p>
+            <a:pPr marL="285750" indent="-285750">
+              <a:buFont typeface="Arial" panose="020B0604020202020204" pitchFamily="34" charset="0"/>
+              <a:buChar char="•"/>
+            </a:pPr>
+            <a:r>
+              <a:rPr lang="en-US" dirty="0"/>
+              <a:t>Point this to an arbitrary location!</a:t>
+            </a:r>
+          </a:p>
+        </p:txBody>
+      </p:sp>
+      <p:pic>
+        <p:nvPicPr>
+          <p:cNvPr id="6" name="Content Placeholder 5" descr="TCache Poision - Overwrite fd value to all A's">
+            <a:extLst>
+              <a:ext uri="{FF2B5EF4-FFF2-40B4-BE49-F238E27FC236}">
+                <a16:creationId xmlns:a16="http://schemas.microsoft.com/office/drawing/2014/main" id="{54EC0B05-5F17-D74A-8683-3E4D3B4193E8}"/>
+              </a:ext>
+            </a:extLst>
+          </p:cNvPr>
+          <p:cNvPicPr>
+            <a:picLocks noGrp="1" noChangeAspect="1"/>
+          </p:cNvPicPr>
+          <p:nvPr>
+            <p:ph idx="1"/>
+          </p:nvPr>
+        </p:nvPicPr>
+        <p:blipFill>
+          <a:blip r:embed="rId2"/>
+          <a:stretch>
+            <a:fillRect/>
+          </a:stretch>
+        </p:blipFill>
+        <p:spPr>
+          <a:xfrm>
+            <a:off x="4796393" y="778420"/>
+            <a:ext cx="3831920" cy="3218813"/>
+          </a:xfrm>
+        </p:spPr>
+      </p:pic>
+    </p:spTree>
+    <p:extLst>
+      <p:ext uri="{BB962C8B-B14F-4D97-AF65-F5344CB8AC3E}">
+        <p14:creationId xmlns:p14="http://schemas.microsoft.com/office/powerpoint/2010/main" val="3111486200"/>
+      </p:ext>
+    </p:extLst>
+  </p:cSld>
+  <p:clrMapOvr>
+    <a:masterClrMapping/>
+  </p:clrMapOvr>
+</p:sld>
+</file>
+
+<file path=ppt/slides/slide25.xml><?xml version="1.0" encoding="utf-8"?>
+<p:sld xmlns:a="http://schemas.openxmlformats.org/drawingml/2006/main" xmlns:r="http://schemas.openxmlformats.org/officeDocument/2006/relationships" xmlns:p="http://schemas.openxmlformats.org/presentationml/2006/main">
+  <p:cSld>
+    <p:spTree>
+      <p:nvGrpSpPr>
+        <p:cNvPr id="1" name=""/>
+        <p:cNvGrpSpPr/>
+        <p:nvPr/>
+      </p:nvGrpSpPr>
+      <p:grpSpPr>
+        <a:xfrm>
+          <a:off x="0" y="0"/>
+          <a:ext cx="0" cy="0"/>
+          <a:chOff x="0" y="0"/>
+          <a:chExt cx="0" cy="0"/>
+        </a:xfrm>
+      </p:grpSpPr>
+      <p:sp>
+        <p:nvSpPr>
+          <p:cNvPr id="2" name="Title 1">
+            <a:extLst>
+              <a:ext uri="{FF2B5EF4-FFF2-40B4-BE49-F238E27FC236}">
+                <a16:creationId xmlns:a16="http://schemas.microsoft.com/office/drawing/2014/main" id="{6C7F1465-9401-1A42-8787-B66FE6422677}"/>
+              </a:ext>
+            </a:extLst>
+          </p:cNvPr>
+          <p:cNvSpPr>
+            <a:spLocks noGrp="1"/>
+          </p:cNvSpPr>
+          <p:nvPr>
+            <p:ph type="title"/>
+          </p:nvPr>
+        </p:nvSpPr>
+        <p:spPr>
+          <a:xfrm>
+            <a:off x="628650" y="273847"/>
+            <a:ext cx="7886700" cy="994172"/>
+          </a:xfrm>
+        </p:spPr>
+        <p:txBody>
+          <a:bodyPr anchor="ctr">
+            <a:normAutofit/>
+          </a:bodyPr>
+          <a:lstStyle/>
+          <a:p>
+            <a:r>
+              <a:rPr lang="en-US" dirty="0"/>
+              <a:t>Fd Pointer to Important String</a:t>
+            </a:r>
+          </a:p>
+        </p:txBody>
+      </p:sp>
+      <p:pic>
+        <p:nvPicPr>
+          <p:cNvPr id="5" name="Content Placeholder 4" descr="Fd poision">
+            <a:extLst>
+              <a:ext uri="{FF2B5EF4-FFF2-40B4-BE49-F238E27FC236}">
+                <a16:creationId xmlns:a16="http://schemas.microsoft.com/office/drawing/2014/main" id="{84C40A55-42F7-F54D-874D-FF4533CEEED6}"/>
+              </a:ext>
+            </a:extLst>
+          </p:cNvPr>
+          <p:cNvPicPr>
+            <a:picLocks noGrp="1" noChangeAspect="1"/>
+          </p:cNvPicPr>
+          <p:nvPr>
+            <p:ph sz="half" idx="1"/>
+          </p:nvPr>
+        </p:nvPicPr>
+        <p:blipFill>
+          <a:blip r:embed="rId2"/>
+          <a:stretch>
+            <a:fillRect/>
+          </a:stretch>
+        </p:blipFill>
+        <p:spPr>
+          <a:xfrm>
+            <a:off x="630661" y="1369219"/>
+            <a:ext cx="3882177" cy="3263504"/>
+          </a:xfrm>
+          <a:noFill/>
+        </p:spPr>
+      </p:pic>
+      <p:sp>
+        <p:nvSpPr>
+          <p:cNvPr id="10" name="Content Placeholder 3">
+            <a:extLst>
+              <a:ext uri="{FF2B5EF4-FFF2-40B4-BE49-F238E27FC236}">
+                <a16:creationId xmlns:a16="http://schemas.microsoft.com/office/drawing/2014/main" id="{9394330D-8DFD-4B26-A391-792CC0643198}"/>
+              </a:ext>
+            </a:extLst>
+          </p:cNvPr>
+          <p:cNvSpPr>
+            <a:spLocks noGrp="1"/>
+          </p:cNvSpPr>
+          <p:nvPr>
+            <p:ph sz="half" idx="2"/>
+          </p:nvPr>
+        </p:nvSpPr>
+        <p:spPr>
+          <a:xfrm>
+            <a:off x="4629150" y="1369219"/>
+            <a:ext cx="3886200" cy="3263504"/>
+          </a:xfrm>
+        </p:spPr>
+        <p:txBody>
+          <a:bodyPr/>
+          <a:lstStyle/>
+          <a:p>
+            <a:r>
+              <a:rPr lang="en-US" dirty="0"/>
+              <a:t>Set </a:t>
+            </a:r>
+            <a:r>
+              <a:rPr lang="en-US" i="1" dirty="0" err="1"/>
+              <a:t>fake_fd_location</a:t>
+            </a:r>
+            <a:r>
+              <a:rPr lang="en-US" dirty="0"/>
+              <a:t> to be </a:t>
+            </a:r>
+            <a:r>
+              <a:rPr lang="en-US" b="1" dirty="0"/>
+              <a:t>0x601080</a:t>
+            </a:r>
+          </a:p>
+          <a:p>
+            <a:r>
+              <a:rPr lang="en-US" dirty="0"/>
+              <a:t>Will overwrite </a:t>
+            </a:r>
+            <a:r>
+              <a:rPr lang="en-US" i="1" dirty="0" err="1"/>
+              <a:t>important_string</a:t>
+            </a:r>
+            <a:r>
+              <a:rPr lang="en-US" dirty="0"/>
+              <a:t> with a location of your choice!</a:t>
+            </a:r>
+          </a:p>
+        </p:txBody>
+      </p:sp>
+    </p:spTree>
+    <p:extLst>
+      <p:ext uri="{BB962C8B-B14F-4D97-AF65-F5344CB8AC3E}">
+        <p14:creationId xmlns:p14="http://schemas.microsoft.com/office/powerpoint/2010/main" val="3273462350"/>
+      </p:ext>
+    </p:extLst>
+  </p:cSld>
+  <p:clrMapOvr>
+    <a:masterClrMapping/>
+  </p:clrMapOvr>
+</p:sld>
+</file>
+
+<file path=ppt/slides/slide26.xml><?xml version="1.0" encoding="utf-8"?>
+<p:sld xmlns:a="http://schemas.openxmlformats.org/drawingml/2006/main" xmlns:r="http://schemas.openxmlformats.org/officeDocument/2006/relationships" xmlns:p="http://schemas.openxmlformats.org/presentationml/2006/main">
+  <p:cSld>
+    <p:spTree>
+      <p:nvGrpSpPr>
+        <p:cNvPr id="1" name=""/>
+        <p:cNvGrpSpPr/>
+        <p:nvPr/>
+      </p:nvGrpSpPr>
+      <p:grpSpPr>
+        <a:xfrm>
+          <a:off x="0" y="0"/>
+          <a:ext cx="0" cy="0"/>
+          <a:chOff x="0" y="0"/>
+          <a:chExt cx="0" cy="0"/>
+        </a:xfrm>
+      </p:grpSpPr>
+      <p:sp>
+        <p:nvSpPr>
+          <p:cNvPr id="2" name="Title 1">
+            <a:extLst>
+              <a:ext uri="{FF2B5EF4-FFF2-40B4-BE49-F238E27FC236}">
+                <a16:creationId xmlns:a16="http://schemas.microsoft.com/office/drawing/2014/main" id="{C8590721-318A-C240-AAE0-556D52B9180C}"/>
+              </a:ext>
+            </a:extLst>
+          </p:cNvPr>
+          <p:cNvSpPr>
+            <a:spLocks noGrp="1"/>
+          </p:cNvSpPr>
+          <p:nvPr>
+            <p:ph type="title"/>
+          </p:nvPr>
+        </p:nvSpPr>
+        <p:spPr>
+          <a:xfrm>
+            <a:off x="628650" y="273847"/>
+            <a:ext cx="7886700" cy="994172"/>
+          </a:xfrm>
+        </p:spPr>
+        <p:txBody>
+          <a:bodyPr anchor="ctr">
+            <a:normAutofit/>
+          </a:bodyPr>
+          <a:lstStyle/>
+          <a:p>
+            <a:r>
+              <a:rPr lang="en-US" dirty="0"/>
+              <a:t>Malloc # 2 – Filler</a:t>
+            </a:r>
+          </a:p>
+        </p:txBody>
+      </p:sp>
+      <p:pic>
+        <p:nvPicPr>
+          <p:cNvPr id="5" name="Content Placeholder 4" descr="Box and whisker chart&#10;&#10;Description automatically generated with medium confidence">
+            <a:extLst>
+              <a:ext uri="{FF2B5EF4-FFF2-40B4-BE49-F238E27FC236}">
+                <a16:creationId xmlns:a16="http://schemas.microsoft.com/office/drawing/2014/main" id="{33BC602D-4A67-2147-9CF9-589F03791107}"/>
+              </a:ext>
+            </a:extLst>
+          </p:cNvPr>
+          <p:cNvPicPr>
+            <a:picLocks noGrp="1" noChangeAspect="1"/>
+          </p:cNvPicPr>
+          <p:nvPr>
+            <p:ph sz="half" idx="1"/>
+          </p:nvPr>
+        </p:nvPicPr>
+        <p:blipFill>
+          <a:blip r:embed="rId2"/>
+          <a:stretch>
+            <a:fillRect/>
+          </a:stretch>
+        </p:blipFill>
+        <p:spPr>
+          <a:xfrm>
+            <a:off x="1280269" y="1369219"/>
+            <a:ext cx="2582962" cy="3263504"/>
+          </a:xfrm>
+          <a:noFill/>
+        </p:spPr>
+      </p:pic>
+      <p:sp>
+        <p:nvSpPr>
+          <p:cNvPr id="10" name="Content Placeholder 3">
+            <a:extLst>
+              <a:ext uri="{FF2B5EF4-FFF2-40B4-BE49-F238E27FC236}">
+                <a16:creationId xmlns:a16="http://schemas.microsoft.com/office/drawing/2014/main" id="{4C894F3D-C993-419A-BB94-E958C43DF78C}"/>
+              </a:ext>
+            </a:extLst>
+          </p:cNvPr>
+          <p:cNvSpPr>
+            <a:spLocks noGrp="1"/>
+          </p:cNvSpPr>
+          <p:nvPr>
+            <p:ph sz="half" idx="2"/>
+          </p:nvPr>
+        </p:nvSpPr>
+        <p:spPr>
+          <a:xfrm>
+            <a:off x="4629150" y="1369219"/>
+            <a:ext cx="3886200" cy="3263504"/>
+          </a:xfrm>
+        </p:spPr>
+        <p:txBody>
+          <a:bodyPr/>
+          <a:lstStyle/>
+          <a:p>
+            <a:r>
+              <a:rPr lang="en-US" dirty="0"/>
+              <a:t>Removed the </a:t>
+            </a:r>
+            <a:r>
+              <a:rPr lang="en-US" i="1" dirty="0"/>
+              <a:t>data</a:t>
+            </a:r>
+            <a:r>
+              <a:rPr lang="en-US" dirty="0"/>
+              <a:t> chunk</a:t>
+            </a:r>
+          </a:p>
+          <a:p>
+            <a:r>
+              <a:rPr lang="en-US" dirty="0"/>
+              <a:t>Next allocation will be our </a:t>
+            </a:r>
+            <a:r>
+              <a:rPr lang="en-US" i="1" dirty="0"/>
+              <a:t>fake chunk!</a:t>
+            </a:r>
+            <a:endParaRPr lang="en-US" dirty="0"/>
+          </a:p>
+        </p:txBody>
+      </p:sp>
+    </p:spTree>
+    <p:extLst>
+      <p:ext uri="{BB962C8B-B14F-4D97-AF65-F5344CB8AC3E}">
+        <p14:creationId xmlns:p14="http://schemas.microsoft.com/office/powerpoint/2010/main" val="298738976"/>
+      </p:ext>
+    </p:extLst>
+  </p:cSld>
+  <p:clrMapOvr>
+    <a:masterClrMapping/>
+  </p:clrMapOvr>
+</p:sld>
+</file>
+
+<file path=ppt/slides/slide27.xml><?xml version="1.0" encoding="utf-8"?>
+<p:sld xmlns:a="http://schemas.openxmlformats.org/drawingml/2006/main" xmlns:r="http://schemas.openxmlformats.org/officeDocument/2006/relationships" xmlns:p="http://schemas.openxmlformats.org/presentationml/2006/main">
+  <p:cSld>
+    <p:spTree>
+      <p:nvGrpSpPr>
+        <p:cNvPr id="1" name=""/>
+        <p:cNvGrpSpPr/>
+        <p:nvPr/>
+      </p:nvGrpSpPr>
+      <p:grpSpPr>
+        <a:xfrm>
+          <a:off x="0" y="0"/>
+          <a:ext cx="0" cy="0"/>
+          <a:chOff x="0" y="0"/>
+          <a:chExt cx="0" cy="0"/>
+        </a:xfrm>
+      </p:grpSpPr>
+      <p:sp>
+        <p:nvSpPr>
+          <p:cNvPr id="2" name="Title 1">
+            <a:extLst>
+              <a:ext uri="{FF2B5EF4-FFF2-40B4-BE49-F238E27FC236}">
+                <a16:creationId xmlns:a16="http://schemas.microsoft.com/office/drawing/2014/main" id="{C8590721-318A-C240-AAE0-556D52B9180C}"/>
+              </a:ext>
+            </a:extLst>
+          </p:cNvPr>
+          <p:cNvSpPr>
+            <a:spLocks noGrp="1"/>
+          </p:cNvSpPr>
+          <p:nvPr>
+            <p:ph type="title"/>
+          </p:nvPr>
+        </p:nvSpPr>
+        <p:spPr>
+          <a:xfrm>
+            <a:off x="628650" y="273847"/>
+            <a:ext cx="7886700" cy="994172"/>
+          </a:xfrm>
+        </p:spPr>
+        <p:txBody>
+          <a:bodyPr anchor="ctr">
+            <a:normAutofit/>
+          </a:bodyPr>
+          <a:lstStyle/>
+          <a:p>
+            <a:r>
+              <a:rPr lang="en-US" dirty="0"/>
+              <a:t>Malloc # 3 – Overwrite!</a:t>
+            </a:r>
+          </a:p>
+        </p:txBody>
+      </p:sp>
+      <p:pic>
+        <p:nvPicPr>
+          <p:cNvPr id="7" name="Content Placeholder 6" descr="Diagram&#10;&#10;Description automatically generated">
+            <a:extLst>
+              <a:ext uri="{FF2B5EF4-FFF2-40B4-BE49-F238E27FC236}">
+                <a16:creationId xmlns:a16="http://schemas.microsoft.com/office/drawing/2014/main" id="{6F432B81-2BAC-8A4C-97E4-731617EA31C5}"/>
+              </a:ext>
+            </a:extLst>
+          </p:cNvPr>
+          <p:cNvPicPr>
+            <a:picLocks noGrp="1" noChangeAspect="1"/>
+          </p:cNvPicPr>
+          <p:nvPr>
+            <p:ph sz="half" idx="1"/>
+          </p:nvPr>
+        </p:nvPicPr>
+        <p:blipFill>
+          <a:blip r:embed="rId2"/>
+          <a:stretch>
+            <a:fillRect/>
+          </a:stretch>
+        </p:blipFill>
+        <p:spPr>
+          <a:xfrm>
+            <a:off x="628650" y="2154392"/>
+            <a:ext cx="3886200" cy="1693157"/>
+          </a:xfrm>
+          <a:noFill/>
+        </p:spPr>
+      </p:pic>
+      <p:sp>
+        <p:nvSpPr>
+          <p:cNvPr id="10" name="Content Placeholder 3">
+            <a:extLst>
+              <a:ext uri="{FF2B5EF4-FFF2-40B4-BE49-F238E27FC236}">
+                <a16:creationId xmlns:a16="http://schemas.microsoft.com/office/drawing/2014/main" id="{4C894F3D-C993-419A-BB94-E958C43DF78C}"/>
+              </a:ext>
+            </a:extLst>
+          </p:cNvPr>
+          <p:cNvSpPr>
+            <a:spLocks noGrp="1"/>
+          </p:cNvSpPr>
+          <p:nvPr>
+            <p:ph sz="half" idx="2"/>
+          </p:nvPr>
+        </p:nvSpPr>
+        <p:spPr>
+          <a:xfrm>
+            <a:off x="4629150" y="1369219"/>
+            <a:ext cx="3886200" cy="3263504"/>
+          </a:xfrm>
+        </p:spPr>
+        <p:txBody>
+          <a:bodyPr>
+            <a:normAutofit/>
+          </a:bodyPr>
+          <a:lstStyle/>
+          <a:p>
+            <a:r>
+              <a:rPr lang="en-US" dirty="0"/>
+              <a:t>Overwrite the data in </a:t>
+            </a:r>
+            <a:r>
+              <a:rPr lang="en-US" i="1" dirty="0" err="1"/>
+              <a:t>important_string</a:t>
+            </a:r>
+            <a:r>
+              <a:rPr lang="en-US" dirty="0"/>
+              <a:t> with our data via the fake chunk</a:t>
+            </a:r>
+          </a:p>
+        </p:txBody>
+      </p:sp>
+    </p:spTree>
+    <p:extLst>
+      <p:ext uri="{BB962C8B-B14F-4D97-AF65-F5344CB8AC3E}">
+        <p14:creationId xmlns:p14="http://schemas.microsoft.com/office/powerpoint/2010/main" val="21259585"/>
+      </p:ext>
+    </p:extLst>
+  </p:cSld>
+  <p:clrMapOvr>
+    <a:masterClrMapping/>
+  </p:clrMapOvr>
+</p:sld>
+</file>
+
+<file path=ppt/slides/slide28.xml><?xml version="1.0" encoding="utf-8"?>
+<p:sld xmlns:a="http://schemas.openxmlformats.org/drawingml/2006/main" xmlns:r="http://schemas.openxmlformats.org/officeDocument/2006/relationships" xmlns:p="http://schemas.openxmlformats.org/presentationml/2006/main">
+  <p:cSld>
+    <p:spTree>
+      <p:nvGrpSpPr>
+        <p:cNvPr id="1" name=""/>
+        <p:cNvGrpSpPr/>
+        <p:nvPr/>
+      </p:nvGrpSpPr>
+      <p:grpSpPr>
+        <a:xfrm>
+          <a:off x="0" y="0"/>
+          <a:ext cx="0" cy="0"/>
+          <a:chOff x="0" y="0"/>
+          <a:chExt cx="0" cy="0"/>
+        </a:xfrm>
+      </p:grpSpPr>
+      <p:sp>
+        <p:nvSpPr>
+          <p:cNvPr id="2" name="Title 1">
+            <a:extLst>
+              <a:ext uri="{FF2B5EF4-FFF2-40B4-BE49-F238E27FC236}">
+                <a16:creationId xmlns:a16="http://schemas.microsoft.com/office/drawing/2014/main" id="{7A08896F-7470-684D-827E-0278797B5F63}"/>
+              </a:ext>
+            </a:extLst>
+          </p:cNvPr>
+          <p:cNvSpPr>
+            <a:spLocks noGrp="1"/>
+          </p:cNvSpPr>
+          <p:nvPr>
+            <p:ph type="title"/>
+          </p:nvPr>
+        </p:nvSpPr>
+        <p:spPr/>
+        <p:txBody>
+          <a:bodyPr/>
+          <a:lstStyle/>
+          <a:p>
+            <a:r>
+              <a:rPr lang="en-US" dirty="0"/>
+              <a:t>Challenge 2 – Real </a:t>
+            </a:r>
+            <a:r>
+              <a:rPr lang="en-US" dirty="0" err="1"/>
+              <a:t>Pwnable</a:t>
+            </a:r>
+            <a:endParaRPr lang="en-US" dirty="0"/>
+          </a:p>
+        </p:txBody>
+      </p:sp>
+      <p:sp>
+        <p:nvSpPr>
+          <p:cNvPr id="3" name="Content Placeholder 2">
+            <a:extLst>
+              <a:ext uri="{FF2B5EF4-FFF2-40B4-BE49-F238E27FC236}">
+                <a16:creationId xmlns:a16="http://schemas.microsoft.com/office/drawing/2014/main" id="{DAB98ED6-5148-D44A-859E-16A5E4E04384}"/>
+              </a:ext>
+            </a:extLst>
+          </p:cNvPr>
+          <p:cNvSpPr>
+            <a:spLocks noGrp="1"/>
+          </p:cNvSpPr>
+          <p:nvPr>
+            <p:ph idx="1"/>
+          </p:nvPr>
+        </p:nvSpPr>
+        <p:spPr/>
+        <p:txBody>
+          <a:bodyPr/>
+          <a:lstStyle/>
+          <a:p>
+            <a:r>
+              <a:rPr lang="en-US" dirty="0"/>
+              <a:t>Use after free vulnerability </a:t>
+            </a:r>
+          </a:p>
+          <a:p>
+            <a:r>
+              <a:rPr lang="en-US" dirty="0"/>
+              <a:t>Leak </a:t>
+            </a:r>
+            <a:r>
+              <a:rPr lang="en-US" dirty="0">
+                <a:sym typeface="Wingdings" pitchFamily="2" charset="2"/>
+              </a:rPr>
+              <a:t>on the </a:t>
+            </a:r>
+            <a:r>
+              <a:rPr lang="en-US" b="1" i="1" dirty="0">
+                <a:sym typeface="Wingdings" pitchFamily="2" charset="2"/>
+              </a:rPr>
+              <a:t>fd</a:t>
+            </a:r>
+            <a:r>
+              <a:rPr lang="en-US" i="1" dirty="0">
+                <a:sym typeface="Wingdings" pitchFamily="2" charset="2"/>
+              </a:rPr>
+              <a:t> </a:t>
+            </a:r>
+            <a:r>
+              <a:rPr lang="en-US" dirty="0">
+                <a:sym typeface="Wingdings" pitchFamily="2" charset="2"/>
+              </a:rPr>
+              <a:t>pointer of a free object (kid) </a:t>
+            </a:r>
+          </a:p>
+          <a:p>
+            <a:r>
+              <a:rPr lang="en-US">
+                <a:sym typeface="Wingdings" pitchFamily="2" charset="2"/>
+              </a:rPr>
+              <a:t>Remember the debugging tips!</a:t>
+            </a:r>
+            <a:endParaRPr lang="en-US" dirty="0">
+              <a:sym typeface="Wingdings" pitchFamily="2" charset="2"/>
+            </a:endParaRPr>
+          </a:p>
+          <a:p>
+            <a:endParaRPr lang="en-US" dirty="0">
+              <a:sym typeface="Wingdings" pitchFamily="2" charset="2"/>
+            </a:endParaRPr>
+          </a:p>
+          <a:p>
+            <a:endParaRPr lang="en-US" dirty="0"/>
+          </a:p>
+        </p:txBody>
+      </p:sp>
+    </p:spTree>
+    <p:extLst>
+      <p:ext uri="{BB962C8B-B14F-4D97-AF65-F5344CB8AC3E}">
+        <p14:creationId xmlns:p14="http://schemas.microsoft.com/office/powerpoint/2010/main" val="2783967685"/>
+      </p:ext>
+    </p:extLst>
+  </p:cSld>
+  <p:clrMapOvr>
+    <a:masterClrMapping/>
+  </p:clrMapOvr>
+</p:sld>
+</file>
+
+<file path=ppt/slides/slide29.xml><?xml version="1.0" encoding="utf-8"?>
+<p:sld xmlns:a="http://schemas.openxmlformats.org/drawingml/2006/main" xmlns:r="http://schemas.openxmlformats.org/officeDocument/2006/relationships" xmlns:p="http://schemas.openxmlformats.org/presentationml/2006/main">
+  <p:cSld>
+    <p:spTree>
+      <p:nvGrpSpPr>
+        <p:cNvPr id="1" name=""/>
+        <p:cNvGrpSpPr/>
+        <p:nvPr/>
+      </p:nvGrpSpPr>
+      <p:grpSpPr>
+        <a:xfrm>
+          <a:off x="0" y="0"/>
+          <a:ext cx="0" cy="0"/>
+          <a:chOff x="0" y="0"/>
+          <a:chExt cx="0" cy="0"/>
+        </a:xfrm>
+      </p:grpSpPr>
+      <p:sp>
+        <p:nvSpPr>
+          <p:cNvPr id="2" name="Title 1">
+            <a:extLst>
+              <a:ext uri="{FF2B5EF4-FFF2-40B4-BE49-F238E27FC236}">
                 <a16:creationId xmlns:a16="http://schemas.microsoft.com/office/drawing/2014/main" id="{68FA92F8-C0D3-1D4E-AFA2-374BCB48A24F}"/>
               </a:ext>
             </a:extLst>
@@ -21859,7 +23068,126 @@
 </p:sld>
 </file>
 
-<file path=ppt/slides/slide22.xml><?xml version="1.0" encoding="utf-8"?>
+<file path=ppt/slides/slide3.xml><?xml version="1.0" encoding="utf-8"?>
+<p:sld xmlns:a="http://schemas.openxmlformats.org/drawingml/2006/main" xmlns:r="http://schemas.openxmlformats.org/officeDocument/2006/relationships" xmlns:p="http://schemas.openxmlformats.org/presentationml/2006/main">
+  <p:cSld>
+    <p:spTree>
+      <p:nvGrpSpPr>
+        <p:cNvPr id="1" name=""/>
+        <p:cNvGrpSpPr/>
+        <p:nvPr/>
+      </p:nvGrpSpPr>
+      <p:grpSpPr>
+        <a:xfrm>
+          <a:off x="0" y="0"/>
+          <a:ext cx="0" cy="0"/>
+          <a:chOff x="0" y="0"/>
+          <a:chExt cx="0" cy="0"/>
+        </a:xfrm>
+      </p:grpSpPr>
+      <p:sp>
+        <p:nvSpPr>
+          <p:cNvPr id="2" name="Title 1">
+            <a:extLst>
+              <a:ext uri="{FF2B5EF4-FFF2-40B4-BE49-F238E27FC236}">
+                <a16:creationId xmlns:a16="http://schemas.microsoft.com/office/drawing/2014/main" id="{2D2415A4-FA59-A441-96A4-63062DAB71D9}"/>
+              </a:ext>
+            </a:extLst>
+          </p:cNvPr>
+          <p:cNvSpPr>
+            <a:spLocks noGrp="1"/>
+          </p:cNvSpPr>
+          <p:nvPr>
+            <p:ph type="title"/>
+          </p:nvPr>
+        </p:nvSpPr>
+        <p:spPr/>
+        <p:txBody>
+          <a:bodyPr/>
+          <a:lstStyle/>
+          <a:p>
+            <a:r>
+              <a:rPr lang="en-US" dirty="0"/>
+              <a:t>Overview</a:t>
+            </a:r>
+          </a:p>
+        </p:txBody>
+      </p:sp>
+      <p:sp>
+        <p:nvSpPr>
+          <p:cNvPr id="3" name="Content Placeholder 2">
+            <a:extLst>
+              <a:ext uri="{FF2B5EF4-FFF2-40B4-BE49-F238E27FC236}">
+                <a16:creationId xmlns:a16="http://schemas.microsoft.com/office/drawing/2014/main" id="{1D2F1DE9-E958-4D4B-9717-6AA1827E8A4A}"/>
+              </a:ext>
+            </a:extLst>
+          </p:cNvPr>
+          <p:cNvSpPr>
+            <a:spLocks noGrp="1"/>
+          </p:cNvSpPr>
+          <p:nvPr>
+            <p:ph idx="1"/>
+          </p:nvPr>
+        </p:nvSpPr>
+        <p:spPr>
+          <a:xfrm>
+            <a:off x="628650" y="1236541"/>
+            <a:ext cx="4458255" cy="3263504"/>
+          </a:xfrm>
+        </p:spPr>
+        <p:txBody>
+          <a:bodyPr/>
+          <a:lstStyle/>
+          <a:p>
+            <a:r>
+              <a:rPr lang="en-US" dirty="0"/>
+              <a:t>Bread &amp; Butter Technique </a:t>
+            </a:r>
+          </a:p>
+          <a:p>
+            <a:r>
+              <a:rPr lang="en-US" dirty="0"/>
+              <a:t>Corrupting singly linked list (</a:t>
+            </a:r>
+            <a:r>
+              <a:rPr lang="en-US" dirty="0" err="1"/>
+              <a:t>tcache</a:t>
+            </a:r>
+            <a:r>
+              <a:rPr lang="en-US" dirty="0"/>
+              <a:t> and </a:t>
+            </a:r>
+            <a:r>
+              <a:rPr lang="en-US" dirty="0" err="1"/>
+              <a:t>fastbins</a:t>
+            </a:r>
+            <a:r>
+              <a:rPr lang="en-US" dirty="0"/>
+              <a:t>) </a:t>
+            </a:r>
+          </a:p>
+          <a:p>
+            <a:r>
+              <a:rPr lang="en-US" dirty="0"/>
+              <a:t>Create chunk almost anywhere!</a:t>
+            </a:r>
+          </a:p>
+        </p:txBody>
+      </p:sp>
+    </p:spTree>
+    <p:extLst>
+      <p:ext uri="{BB962C8B-B14F-4D97-AF65-F5344CB8AC3E}">
+        <p14:creationId xmlns:p14="http://schemas.microsoft.com/office/powerpoint/2010/main" val="2530545686"/>
+      </p:ext>
+    </p:extLst>
+  </p:cSld>
+  <p:clrMapOvr>
+    <a:masterClrMapping/>
+  </p:clrMapOvr>
+</p:sld>
+</file>
+
+<file path=ppt/slides/slide30.xml><?xml version="1.0" encoding="utf-8"?>
 <p:sld xmlns:a="http://schemas.openxmlformats.org/drawingml/2006/main" xmlns:r="http://schemas.openxmlformats.org/officeDocument/2006/relationships" xmlns:p="http://schemas.openxmlformats.org/presentationml/2006/main">
   <p:cSld>
     <p:spTree>
@@ -21955,7 +23283,7 @@
 </p:sld>
 </file>
 
-<file path=ppt/slides/slide23.xml><?xml version="1.0" encoding="utf-8"?>
+<file path=ppt/slides/slide31.xml><?xml version="1.0" encoding="utf-8"?>
 <p:sld xmlns:a="http://schemas.openxmlformats.org/drawingml/2006/main" xmlns:r="http://schemas.openxmlformats.org/officeDocument/2006/relationships" xmlns:p="http://schemas.openxmlformats.org/presentationml/2006/main">
   <p:cSld>
     <p:spTree>
@@ -22103,7 +23431,7 @@
 </p:sld>
 </file>
 
-<file path=ppt/slides/slide24.xml><?xml version="1.0" encoding="utf-8"?>
+<file path=ppt/slides/slide32.xml><?xml version="1.0" encoding="utf-8"?>
 <p:sld xmlns:a="http://schemas.openxmlformats.org/drawingml/2006/main" xmlns:r="http://schemas.openxmlformats.org/officeDocument/2006/relationships" xmlns:p="http://schemas.openxmlformats.org/presentationml/2006/main">
   <p:cSld>
     <p:spTree>
@@ -22304,7 +23632,7 @@
 </p:sld>
 </file>
 
-<file path=ppt/slides/slide25.xml><?xml version="1.0" encoding="utf-8"?>
+<file path=ppt/slides/slide33.xml><?xml version="1.0" encoding="utf-8"?>
 <p:sld xmlns:a="http://schemas.openxmlformats.org/drawingml/2006/main" xmlns:r="http://schemas.openxmlformats.org/officeDocument/2006/relationships" xmlns:p="http://schemas.openxmlformats.org/presentationml/2006/main">
   <p:cSld>
     <p:spTree>
@@ -22495,7 +23823,7 @@
 </p:sld>
 </file>
 
-<file path=ppt/slides/slide26.xml><?xml version="1.0" encoding="utf-8"?>
+<file path=ppt/slides/slide34.xml><?xml version="1.0" encoding="utf-8"?>
 <p:sld xmlns:a="http://schemas.openxmlformats.org/drawingml/2006/main" xmlns:r="http://schemas.openxmlformats.org/officeDocument/2006/relationships" xmlns:p="http://schemas.openxmlformats.org/presentationml/2006/main">
   <p:cSld>
     <p:spTree>
@@ -22861,7 +24189,7 @@
 </p:sld>
 </file>
 
-<file path=ppt/slides/slide27.xml><?xml version="1.0" encoding="utf-8"?>
+<file path=ppt/slides/slide35.xml><?xml version="1.0" encoding="utf-8"?>
 <p:sld xmlns:a="http://schemas.openxmlformats.org/drawingml/2006/main" xmlns:r="http://schemas.openxmlformats.org/officeDocument/2006/relationships" xmlns:p="http://schemas.openxmlformats.org/presentationml/2006/main">
   <p:cSld>
     <p:spTree>
@@ -23163,7 +24491,7 @@
 </p:sld>
 </file>
 
-<file path=ppt/slides/slide28.xml><?xml version="1.0" encoding="utf-8"?>
+<file path=ppt/slides/slide36.xml><?xml version="1.0" encoding="utf-8"?>
 <p:sld xmlns:a="http://schemas.openxmlformats.org/drawingml/2006/main" xmlns:r="http://schemas.openxmlformats.org/officeDocument/2006/relationships" xmlns:p="http://schemas.openxmlformats.org/presentationml/2006/main">
   <p:cSld>
     <p:spTree>
@@ -23469,7 +24797,7 @@
 </p:sld>
 </file>
 
-<file path=ppt/slides/slide29.xml><?xml version="1.0" encoding="utf-8"?>
+<file path=ppt/slides/slide37.xml><?xml version="1.0" encoding="utf-8"?>
 <p:sld xmlns:a="http://schemas.openxmlformats.org/drawingml/2006/main" xmlns:r="http://schemas.openxmlformats.org/officeDocument/2006/relationships" xmlns:p="http://schemas.openxmlformats.org/presentationml/2006/main">
   <p:cSld>
     <p:spTree>
@@ -23655,126 +24983,7 @@
 </p:sld>
 </file>
 
-<file path=ppt/slides/slide3.xml><?xml version="1.0" encoding="utf-8"?>
-<p:sld xmlns:a="http://schemas.openxmlformats.org/drawingml/2006/main" xmlns:r="http://schemas.openxmlformats.org/officeDocument/2006/relationships" xmlns:p="http://schemas.openxmlformats.org/presentationml/2006/main">
-  <p:cSld>
-    <p:spTree>
-      <p:nvGrpSpPr>
-        <p:cNvPr id="1" name=""/>
-        <p:cNvGrpSpPr/>
-        <p:nvPr/>
-      </p:nvGrpSpPr>
-      <p:grpSpPr>
-        <a:xfrm>
-          <a:off x="0" y="0"/>
-          <a:ext cx="0" cy="0"/>
-          <a:chOff x="0" y="0"/>
-          <a:chExt cx="0" cy="0"/>
-        </a:xfrm>
-      </p:grpSpPr>
-      <p:sp>
-        <p:nvSpPr>
-          <p:cNvPr id="2" name="Title 1">
-            <a:extLst>
-              <a:ext uri="{FF2B5EF4-FFF2-40B4-BE49-F238E27FC236}">
-                <a16:creationId xmlns:a16="http://schemas.microsoft.com/office/drawing/2014/main" id="{2D2415A4-FA59-A441-96A4-63062DAB71D9}"/>
-              </a:ext>
-            </a:extLst>
-          </p:cNvPr>
-          <p:cNvSpPr>
-            <a:spLocks noGrp="1"/>
-          </p:cNvSpPr>
-          <p:nvPr>
-            <p:ph type="title"/>
-          </p:nvPr>
-        </p:nvSpPr>
-        <p:spPr/>
-        <p:txBody>
-          <a:bodyPr/>
-          <a:lstStyle/>
-          <a:p>
-            <a:r>
-              <a:rPr lang="en-US" dirty="0"/>
-              <a:t>Overview</a:t>
-            </a:r>
-          </a:p>
-        </p:txBody>
-      </p:sp>
-      <p:sp>
-        <p:nvSpPr>
-          <p:cNvPr id="3" name="Content Placeholder 2">
-            <a:extLst>
-              <a:ext uri="{FF2B5EF4-FFF2-40B4-BE49-F238E27FC236}">
-                <a16:creationId xmlns:a16="http://schemas.microsoft.com/office/drawing/2014/main" id="{1D2F1DE9-E958-4D4B-9717-6AA1827E8A4A}"/>
-              </a:ext>
-            </a:extLst>
-          </p:cNvPr>
-          <p:cNvSpPr>
-            <a:spLocks noGrp="1"/>
-          </p:cNvSpPr>
-          <p:nvPr>
-            <p:ph idx="1"/>
-          </p:nvPr>
-        </p:nvSpPr>
-        <p:spPr>
-          <a:xfrm>
-            <a:off x="628650" y="1236541"/>
-            <a:ext cx="4458255" cy="3263504"/>
-          </a:xfrm>
-        </p:spPr>
-        <p:txBody>
-          <a:bodyPr/>
-          <a:lstStyle/>
-          <a:p>
-            <a:r>
-              <a:rPr lang="en-US" dirty="0"/>
-              <a:t>Bread &amp; Butter Technique </a:t>
-            </a:r>
-          </a:p>
-          <a:p>
-            <a:r>
-              <a:rPr lang="en-US" dirty="0"/>
-              <a:t>Corrupting singly linked list (</a:t>
-            </a:r>
-            <a:r>
-              <a:rPr lang="en-US" dirty="0" err="1"/>
-              <a:t>tcache</a:t>
-            </a:r>
-            <a:r>
-              <a:rPr lang="en-US" dirty="0"/>
-              <a:t> and </a:t>
-            </a:r>
-            <a:r>
-              <a:rPr lang="en-US" dirty="0" err="1"/>
-              <a:t>fastbins</a:t>
-            </a:r>
-            <a:r>
-              <a:rPr lang="en-US" dirty="0"/>
-              <a:t>) </a:t>
-            </a:r>
-          </a:p>
-          <a:p>
-            <a:r>
-              <a:rPr lang="en-US" dirty="0"/>
-              <a:t>Create chunk almost anywhere!</a:t>
-            </a:r>
-          </a:p>
-        </p:txBody>
-      </p:sp>
-    </p:spTree>
-    <p:extLst>
-      <p:ext uri="{BB962C8B-B14F-4D97-AF65-F5344CB8AC3E}">
-        <p14:creationId xmlns:p14="http://schemas.microsoft.com/office/powerpoint/2010/main" val="2530545686"/>
-      </p:ext>
-    </p:extLst>
-  </p:cSld>
-  <p:clrMapOvr>
-    <a:masterClrMapping/>
-  </p:clrMapOvr>
-</p:sld>
-</file>
-
-<file path=ppt/slides/slide30.xml><?xml version="1.0" encoding="utf-8"?>
+<file path=ppt/slides/slide38.xml><?xml version="1.0" encoding="utf-8"?>
 <p:sld xmlns:a="http://schemas.openxmlformats.org/drawingml/2006/main" xmlns:r="http://schemas.openxmlformats.org/officeDocument/2006/relationships" xmlns:p="http://schemas.openxmlformats.org/presentationml/2006/main">
   <p:cSld>
     <p:spTree>
@@ -23870,7 +25079,7 @@
 </p:sld>
 </file>
 
-<file path=ppt/slides/slide31.xml><?xml version="1.0" encoding="utf-8"?>
+<file path=ppt/slides/slide39.xml><?xml version="1.0" encoding="utf-8"?>
 <p:sld xmlns:a="http://schemas.openxmlformats.org/drawingml/2006/main" xmlns:r="http://schemas.openxmlformats.org/officeDocument/2006/relationships" xmlns:p="http://schemas.openxmlformats.org/presentationml/2006/main">
   <p:cSld>
     <p:spTree>
@@ -23966,7 +25175,136 @@
 </p:sld>
 </file>
 
-<file path=ppt/slides/slide32.xml><?xml version="1.0" encoding="utf-8"?>
+<file path=ppt/slides/slide4.xml><?xml version="1.0" encoding="utf-8"?>
+<p:sld xmlns:a="http://schemas.openxmlformats.org/drawingml/2006/main" xmlns:r="http://schemas.openxmlformats.org/officeDocument/2006/relationships" xmlns:p="http://schemas.openxmlformats.org/presentationml/2006/main">
+  <p:cSld>
+    <p:spTree>
+      <p:nvGrpSpPr>
+        <p:cNvPr id="1" name=""/>
+        <p:cNvGrpSpPr/>
+        <p:nvPr/>
+      </p:nvGrpSpPr>
+      <p:grpSpPr>
+        <a:xfrm>
+          <a:off x="0" y="0"/>
+          <a:ext cx="0" cy="0"/>
+          <a:chOff x="0" y="0"/>
+          <a:chExt cx="0" cy="0"/>
+        </a:xfrm>
+      </p:grpSpPr>
+      <p:sp>
+        <p:nvSpPr>
+          <p:cNvPr id="2" name="Title 1">
+            <a:extLst>
+              <a:ext uri="{FF2B5EF4-FFF2-40B4-BE49-F238E27FC236}">
+                <a16:creationId xmlns:a16="http://schemas.microsoft.com/office/drawing/2014/main" id="{D3226B31-8E27-9B42-BD86-BB21545EE327}"/>
+              </a:ext>
+            </a:extLst>
+          </p:cNvPr>
+          <p:cNvSpPr>
+            <a:spLocks noGrp="1"/>
+          </p:cNvSpPr>
+          <p:nvPr>
+            <p:ph type="title"/>
+          </p:nvPr>
+        </p:nvSpPr>
+        <p:spPr/>
+        <p:txBody>
+          <a:bodyPr/>
+          <a:lstStyle/>
+          <a:p>
+            <a:r>
+              <a:rPr lang="en-US" dirty="0"/>
+              <a:t>Three Sections</a:t>
+            </a:r>
+          </a:p>
+        </p:txBody>
+      </p:sp>
+      <p:sp>
+        <p:nvSpPr>
+          <p:cNvPr id="3" name="Content Placeholder 2">
+            <a:extLst>
+              <a:ext uri="{FF2B5EF4-FFF2-40B4-BE49-F238E27FC236}">
+                <a16:creationId xmlns:a16="http://schemas.microsoft.com/office/drawing/2014/main" id="{74482978-8512-934C-89F9-3C551896ECDF}"/>
+              </a:ext>
+            </a:extLst>
+          </p:cNvPr>
+          <p:cNvSpPr>
+            <a:spLocks noGrp="1"/>
+          </p:cNvSpPr>
+          <p:nvPr>
+            <p:ph idx="1"/>
+          </p:nvPr>
+        </p:nvSpPr>
+        <p:spPr/>
+        <p:txBody>
+          <a:bodyPr/>
+          <a:lstStyle/>
+          <a:p>
+            <a:r>
+              <a:rPr lang="en-US" b="1" dirty="0"/>
+              <a:t>TCache (No Validations) </a:t>
+            </a:r>
+            <a:r>
+              <a:rPr lang="en-US" b="1" dirty="0">
+                <a:sym typeface="Wingdings" pitchFamily="2" charset="2"/>
+              </a:rPr>
+              <a:t> </a:t>
+            </a:r>
+            <a:r>
+              <a:rPr lang="en-US" dirty="0">
+                <a:sym typeface="Wingdings" pitchFamily="2" charset="2"/>
+              </a:rPr>
+              <a:t>Right now</a:t>
+            </a:r>
+            <a:endParaRPr lang="en-US" dirty="0"/>
+          </a:p>
+          <a:p>
+            <a:r>
+              <a:rPr lang="en-US" dirty="0" err="1"/>
+              <a:t>Fastbin</a:t>
+            </a:r>
+            <a:r>
+              <a:rPr lang="en-US" dirty="0"/>
+              <a:t> (Very few Validations) </a:t>
+            </a:r>
+          </a:p>
+          <a:p>
+            <a:r>
+              <a:rPr lang="en-US" dirty="0"/>
+              <a:t>2.32+</a:t>
+            </a:r>
+          </a:p>
+          <a:p>
+            <a:pPr lvl="1"/>
+            <a:r>
+              <a:rPr lang="en-US" dirty="0"/>
+              <a:t>Pointer Mangling (later) </a:t>
+            </a:r>
+          </a:p>
+          <a:p>
+            <a:pPr lvl="1"/>
+            <a:r>
+              <a:rPr lang="en-US" dirty="0"/>
+              <a:t>Chunk alignment</a:t>
+            </a:r>
+          </a:p>
+        </p:txBody>
+      </p:sp>
+    </p:spTree>
+    <p:extLst>
+      <p:ext uri="{BB962C8B-B14F-4D97-AF65-F5344CB8AC3E}">
+        <p14:creationId xmlns:p14="http://schemas.microsoft.com/office/powerpoint/2010/main" val="1887160673"/>
+      </p:ext>
+    </p:extLst>
+  </p:cSld>
+  <p:clrMapOvr>
+    <a:masterClrMapping/>
+  </p:clrMapOvr>
+</p:sld>
+</file>
+
+<file path=ppt/slides/slide40.xml><?xml version="1.0" encoding="utf-8"?>
 <p:sld xmlns:a="http://schemas.openxmlformats.org/drawingml/2006/main" xmlns:r="http://schemas.openxmlformats.org/officeDocument/2006/relationships" xmlns:p="http://schemas.openxmlformats.org/presentationml/2006/main">
   <p:cSld>
     <p:spTree>
@@ -24095,7 +25433,7 @@
 </p:sld>
 </file>
 
-<file path=ppt/slides/slide33.xml><?xml version="1.0" encoding="utf-8"?>
+<file path=ppt/slides/slide41.xml><?xml version="1.0" encoding="utf-8"?>
 <p:sld xmlns:a="http://schemas.openxmlformats.org/drawingml/2006/main" xmlns:r="http://schemas.openxmlformats.org/officeDocument/2006/relationships" xmlns:p="http://schemas.openxmlformats.org/presentationml/2006/main">
   <p:cSld>
     <p:spTree>
@@ -24231,7 +25569,7 @@
 </p:sld>
 </file>
 
-<file path=ppt/slides/slide34.xml><?xml version="1.0" encoding="utf-8"?>
+<file path=ppt/slides/slide42.xml><?xml version="1.0" encoding="utf-8"?>
 <p:sld xmlns:a="http://schemas.openxmlformats.org/drawingml/2006/main" xmlns:r="http://schemas.openxmlformats.org/officeDocument/2006/relationships" xmlns:p="http://schemas.openxmlformats.org/presentationml/2006/main">
   <p:cSld>
     <p:spTree>
@@ -24388,7 +25726,7 @@
 </p:sld>
 </file>
 
-<file path=ppt/slides/slide35.xml><?xml version="1.0" encoding="utf-8"?>
+<file path=ppt/slides/slide43.xml><?xml version="1.0" encoding="utf-8"?>
 <p:sld xmlns:a="http://schemas.openxmlformats.org/drawingml/2006/main" xmlns:r="http://schemas.openxmlformats.org/officeDocument/2006/relationships" xmlns:p="http://schemas.openxmlformats.org/presentationml/2006/main">
   <p:cSld>
     <p:spTree>
@@ -24605,7 +25943,7 @@
 </p:sld>
 </file>
 
-<file path=ppt/slides/slide36.xml><?xml version="1.0" encoding="utf-8"?>
+<file path=ppt/slides/slide44.xml><?xml version="1.0" encoding="utf-8"?>
 <p:sld xmlns:a="http://schemas.openxmlformats.org/drawingml/2006/main" xmlns:r="http://schemas.openxmlformats.org/officeDocument/2006/relationships" xmlns:p="http://schemas.openxmlformats.org/presentationml/2006/main">
   <p:cSld>
     <p:spTree>
@@ -24810,7 +26148,7 @@
 </p:sld>
 </file>
 
-<file path=ppt/slides/slide37.xml><?xml version="1.0" encoding="utf-8"?>
+<file path=ppt/slides/slide45.xml><?xml version="1.0" encoding="utf-8"?>
 <p:sld xmlns:a="http://schemas.openxmlformats.org/drawingml/2006/main" xmlns:r="http://schemas.openxmlformats.org/officeDocument/2006/relationships" xmlns:p="http://schemas.openxmlformats.org/presentationml/2006/main">
   <p:cSld>
     <p:spTree>
@@ -24961,7 +26299,7 @@
 </p:sld>
 </file>
 
-<file path=ppt/slides/slide38.xml><?xml version="1.0" encoding="utf-8"?>
+<file path=ppt/slides/slide46.xml><?xml version="1.0" encoding="utf-8"?>
 <p:sld xmlns:a="http://schemas.openxmlformats.org/drawingml/2006/main" xmlns:r="http://schemas.openxmlformats.org/officeDocument/2006/relationships" xmlns:p="http://schemas.openxmlformats.org/presentationml/2006/main">
   <p:cSld>
     <p:spTree>
@@ -25070,7 +26408,7 @@
 </p:sld>
 </file>
 
-<file path=ppt/slides/slide39.xml><?xml version="1.0" encoding="utf-8"?>
+<file path=ppt/slides/slide47.xml><?xml version="1.0" encoding="utf-8"?>
 <p:sld xmlns:a="http://schemas.openxmlformats.org/drawingml/2006/main" xmlns:r="http://schemas.openxmlformats.org/officeDocument/2006/relationships" xmlns:p="http://schemas.openxmlformats.org/presentationml/2006/main">
   <p:cSld>
     <p:spTree>
@@ -25252,136 +26590,7 @@
 </p:sld>
 </file>
 
-<file path=ppt/slides/slide4.xml><?xml version="1.0" encoding="utf-8"?>
-<p:sld xmlns:a="http://schemas.openxmlformats.org/drawingml/2006/main" xmlns:r="http://schemas.openxmlformats.org/officeDocument/2006/relationships" xmlns:p="http://schemas.openxmlformats.org/presentationml/2006/main">
-  <p:cSld>
-    <p:spTree>
-      <p:nvGrpSpPr>
-        <p:cNvPr id="1" name=""/>
-        <p:cNvGrpSpPr/>
-        <p:nvPr/>
-      </p:nvGrpSpPr>
-      <p:grpSpPr>
-        <a:xfrm>
-          <a:off x="0" y="0"/>
-          <a:ext cx="0" cy="0"/>
-          <a:chOff x="0" y="0"/>
-          <a:chExt cx="0" cy="0"/>
-        </a:xfrm>
-      </p:grpSpPr>
-      <p:sp>
-        <p:nvSpPr>
-          <p:cNvPr id="2" name="Title 1">
-            <a:extLst>
-              <a:ext uri="{FF2B5EF4-FFF2-40B4-BE49-F238E27FC236}">
-                <a16:creationId xmlns:a16="http://schemas.microsoft.com/office/drawing/2014/main" id="{D3226B31-8E27-9B42-BD86-BB21545EE327}"/>
-              </a:ext>
-            </a:extLst>
-          </p:cNvPr>
-          <p:cNvSpPr>
-            <a:spLocks noGrp="1"/>
-          </p:cNvSpPr>
-          <p:nvPr>
-            <p:ph type="title"/>
-          </p:nvPr>
-        </p:nvSpPr>
-        <p:spPr/>
-        <p:txBody>
-          <a:bodyPr/>
-          <a:lstStyle/>
-          <a:p>
-            <a:r>
-              <a:rPr lang="en-US" dirty="0"/>
-              <a:t>Three Sections</a:t>
-            </a:r>
-          </a:p>
-        </p:txBody>
-      </p:sp>
-      <p:sp>
-        <p:nvSpPr>
-          <p:cNvPr id="3" name="Content Placeholder 2">
-            <a:extLst>
-              <a:ext uri="{FF2B5EF4-FFF2-40B4-BE49-F238E27FC236}">
-                <a16:creationId xmlns:a16="http://schemas.microsoft.com/office/drawing/2014/main" id="{74482978-8512-934C-89F9-3C551896ECDF}"/>
-              </a:ext>
-            </a:extLst>
-          </p:cNvPr>
-          <p:cNvSpPr>
-            <a:spLocks noGrp="1"/>
-          </p:cNvSpPr>
-          <p:nvPr>
-            <p:ph idx="1"/>
-          </p:nvPr>
-        </p:nvSpPr>
-        <p:spPr/>
-        <p:txBody>
-          <a:bodyPr/>
-          <a:lstStyle/>
-          <a:p>
-            <a:r>
-              <a:rPr lang="en-US" b="1" dirty="0"/>
-              <a:t>TCache (No Validations) </a:t>
-            </a:r>
-            <a:r>
-              <a:rPr lang="en-US" b="1" dirty="0">
-                <a:sym typeface="Wingdings" pitchFamily="2" charset="2"/>
-              </a:rPr>
-              <a:t> </a:t>
-            </a:r>
-            <a:r>
-              <a:rPr lang="en-US" dirty="0">
-                <a:sym typeface="Wingdings" pitchFamily="2" charset="2"/>
-              </a:rPr>
-              <a:t>Right now</a:t>
-            </a:r>
-            <a:endParaRPr lang="en-US" dirty="0"/>
-          </a:p>
-          <a:p>
-            <a:r>
-              <a:rPr lang="en-US" dirty="0" err="1"/>
-              <a:t>Fastbin</a:t>
-            </a:r>
-            <a:r>
-              <a:rPr lang="en-US" dirty="0"/>
-              <a:t> (Very few Validations) </a:t>
-            </a:r>
-          </a:p>
-          <a:p>
-            <a:r>
-              <a:rPr lang="en-US" dirty="0"/>
-              <a:t>2.32+</a:t>
-            </a:r>
-          </a:p>
-          <a:p>
-            <a:pPr lvl="1"/>
-            <a:r>
-              <a:rPr lang="en-US" dirty="0"/>
-              <a:t>Pointer Mangling (later) </a:t>
-            </a:r>
-          </a:p>
-          <a:p>
-            <a:pPr lvl="1"/>
-            <a:r>
-              <a:rPr lang="en-US" dirty="0"/>
-              <a:t>Chunk alignment</a:t>
-            </a:r>
-          </a:p>
-        </p:txBody>
-      </p:sp>
-    </p:spTree>
-    <p:extLst>
-      <p:ext uri="{BB962C8B-B14F-4D97-AF65-F5344CB8AC3E}">
-        <p14:creationId xmlns:p14="http://schemas.microsoft.com/office/powerpoint/2010/main" val="1887160673"/>
-      </p:ext>
-    </p:extLst>
-  </p:cSld>
-  <p:clrMapOvr>
-    <a:masterClrMapping/>
-  </p:clrMapOvr>
-</p:sld>
-</file>
-
-<file path=ppt/slides/slide40.xml><?xml version="1.0" encoding="utf-8"?>
+<file path=ppt/slides/slide48.xml><?xml version="1.0" encoding="utf-8"?>
 <p:sld xmlns:a="http://schemas.openxmlformats.org/drawingml/2006/main" xmlns:r="http://schemas.openxmlformats.org/officeDocument/2006/relationships" xmlns:p="http://schemas.openxmlformats.org/presentationml/2006/main">
   <p:cSld>
     <p:spTree>
@@ -25565,7 +26774,7 @@
 </p:sld>
 </file>
 
-<file path=ppt/slides/slide41.xml><?xml version="1.0" encoding="utf-8"?>
+<file path=ppt/slides/slide49.xml><?xml version="1.0" encoding="utf-8"?>
 <p:sld xmlns:a="http://schemas.openxmlformats.org/drawingml/2006/main" xmlns:r="http://schemas.openxmlformats.org/officeDocument/2006/relationships" xmlns:p="http://schemas.openxmlformats.org/presentationml/2006/main">
   <p:cSld>
     <p:spTree>
@@ -26020,7 +27229,162 @@
 </p:sld>
 </file>
 
-<file path=ppt/slides/slide42.xml><?xml version="1.0" encoding="utf-8"?>
+<file path=ppt/slides/slide5.xml><?xml version="1.0" encoding="utf-8"?>
+<p:sld xmlns:a="http://schemas.openxmlformats.org/drawingml/2006/main" xmlns:r="http://schemas.openxmlformats.org/officeDocument/2006/relationships" xmlns:p="http://schemas.openxmlformats.org/presentationml/2006/main">
+  <p:cSld>
+    <p:spTree>
+      <p:nvGrpSpPr>
+        <p:cNvPr id="1" name=""/>
+        <p:cNvGrpSpPr/>
+        <p:nvPr/>
+      </p:nvGrpSpPr>
+      <p:grpSpPr>
+        <a:xfrm>
+          <a:off x="0" y="0"/>
+          <a:ext cx="0" cy="0"/>
+          <a:chOff x="0" y="0"/>
+          <a:chExt cx="0" cy="0"/>
+        </a:xfrm>
+      </p:grpSpPr>
+      <p:sp>
+        <p:nvSpPr>
+          <p:cNvPr id="2" name="Title 1">
+            <a:extLst>
+              <a:ext uri="{FF2B5EF4-FFF2-40B4-BE49-F238E27FC236}">
+                <a16:creationId xmlns:a16="http://schemas.microsoft.com/office/drawing/2014/main" id="{9FCC93A9-1909-0944-9099-9A612E388F3E}"/>
+              </a:ext>
+            </a:extLst>
+          </p:cNvPr>
+          <p:cNvSpPr>
+            <a:spLocks noGrp="1"/>
+          </p:cNvSpPr>
+          <p:nvPr>
+            <p:ph type="title"/>
+          </p:nvPr>
+        </p:nvSpPr>
+        <p:spPr/>
+        <p:txBody>
+          <a:bodyPr/>
+          <a:lstStyle/>
+          <a:p>
+            <a:r>
+              <a:rPr lang="en-US" dirty="0"/>
+              <a:t>TCache Bins (Review)</a:t>
+            </a:r>
+          </a:p>
+        </p:txBody>
+      </p:sp>
+      <p:sp>
+        <p:nvSpPr>
+          <p:cNvPr id="3" name="Content Placeholder 2">
+            <a:extLst>
+              <a:ext uri="{FF2B5EF4-FFF2-40B4-BE49-F238E27FC236}">
+                <a16:creationId xmlns:a16="http://schemas.microsoft.com/office/drawing/2014/main" id="{2FF03EE8-B255-A142-84D0-A4B901FA6492}"/>
+              </a:ext>
+            </a:extLst>
+          </p:cNvPr>
+          <p:cNvSpPr>
+            <a:spLocks noGrp="1"/>
+          </p:cNvSpPr>
+          <p:nvPr>
+            <p:ph idx="1"/>
+          </p:nvPr>
+        </p:nvSpPr>
+        <p:spPr>
+          <a:xfrm>
+            <a:off x="628650" y="1236541"/>
+            <a:ext cx="4103148" cy="3726076"/>
+          </a:xfrm>
+        </p:spPr>
+        <p:txBody>
+          <a:bodyPr>
+            <a:normAutofit/>
+          </a:bodyPr>
+          <a:lstStyle/>
+          <a:p>
+            <a:r>
+              <a:rPr lang="en-US" dirty="0"/>
+              <a:t>Added in </a:t>
+            </a:r>
+            <a:r>
+              <a:rPr lang="en-US" dirty="0" err="1"/>
+              <a:t>GLibC</a:t>
+            </a:r>
+            <a:r>
+              <a:rPr lang="en-US" dirty="0"/>
+              <a:t> Malloc 2.26 (2018ish)</a:t>
+            </a:r>
+          </a:p>
+          <a:p>
+            <a:r>
+              <a:rPr lang="en-US" b="1" dirty="0"/>
+              <a:t>Thread Specific</a:t>
+            </a:r>
+            <a:r>
+              <a:rPr lang="en-US" dirty="0"/>
+              <a:t>:</a:t>
+            </a:r>
+          </a:p>
+          <a:p>
+            <a:pPr lvl="1"/>
+            <a:r>
+              <a:rPr lang="en-US" dirty="0"/>
+              <a:t>This allows for mutexes to not be required!</a:t>
+            </a:r>
+          </a:p>
+          <a:p>
+            <a:r>
+              <a:rPr lang="en-US" dirty="0"/>
+              <a:t>Properties: </a:t>
+            </a:r>
+          </a:p>
+          <a:p>
+            <a:pPr lvl="1"/>
+            <a:r>
+              <a:rPr lang="en-US" dirty="0"/>
+              <a:t>Each thread has 64 singly-linked TCache bins. </a:t>
+            </a:r>
+          </a:p>
+          <a:p>
+            <a:pPr lvl="1"/>
+            <a:r>
+              <a:rPr lang="en-US" dirty="0"/>
+              <a:t>Limit to 7 chunks per bin </a:t>
+            </a:r>
+          </a:p>
+          <a:p>
+            <a:pPr lvl="1"/>
+            <a:r>
+              <a:rPr lang="en-US" dirty="0"/>
+              <a:t>0x20 is smallest bin size</a:t>
+            </a:r>
+          </a:p>
+          <a:p>
+            <a:endParaRPr lang="en-US" dirty="0"/>
+          </a:p>
+          <a:p>
+            <a:pPr lvl="1"/>
+            <a:endParaRPr lang="en-US" dirty="0"/>
+          </a:p>
+          <a:p>
+            <a:endParaRPr lang="en-US" dirty="0"/>
+          </a:p>
+        </p:txBody>
+      </p:sp>
+    </p:spTree>
+    <p:extLst>
+      <p:ext uri="{BB962C8B-B14F-4D97-AF65-F5344CB8AC3E}">
+        <p14:creationId xmlns:p14="http://schemas.microsoft.com/office/powerpoint/2010/main" val="3131075558"/>
+      </p:ext>
+    </p:extLst>
+  </p:cSld>
+  <p:clrMapOvr>
+    <a:masterClrMapping/>
+  </p:clrMapOvr>
+</p:sld>
+</file>
+
+<file path=ppt/slides/slide50.xml><?xml version="1.0" encoding="utf-8"?>
 <p:sld xmlns:a="http://schemas.openxmlformats.org/drawingml/2006/main" xmlns:r="http://schemas.openxmlformats.org/officeDocument/2006/relationships" xmlns:p="http://schemas.openxmlformats.org/presentationml/2006/main">
   <p:cSld>
     <p:spTree>
@@ -26126,7 +27490,7 @@
 </p:sld>
 </file>
 
-<file path=ppt/slides/slide43.xml><?xml version="1.0" encoding="utf-8"?>
+<file path=ppt/slides/slide51.xml><?xml version="1.0" encoding="utf-8"?>
 <p:sld xmlns:a="http://schemas.openxmlformats.org/drawingml/2006/main" xmlns:r="http://schemas.openxmlformats.org/officeDocument/2006/relationships" xmlns:p="http://schemas.openxmlformats.org/presentationml/2006/main">
   <p:cSld>
     <p:spTree>
@@ -26203,161 +27567,6 @@
     <p:extLst>
       <p:ext uri="{BB962C8B-B14F-4D97-AF65-F5344CB8AC3E}">
         <p14:creationId xmlns:p14="http://schemas.microsoft.com/office/powerpoint/2010/main" val="3986142602"/>
-      </p:ext>
-    </p:extLst>
-  </p:cSld>
-  <p:clrMapOvr>
-    <a:masterClrMapping/>
-  </p:clrMapOvr>
-</p:sld>
-</file>
-
-<file path=ppt/slides/slide5.xml><?xml version="1.0" encoding="utf-8"?>
-<p:sld xmlns:a="http://schemas.openxmlformats.org/drawingml/2006/main" xmlns:r="http://schemas.openxmlformats.org/officeDocument/2006/relationships" xmlns:p="http://schemas.openxmlformats.org/presentationml/2006/main">
-  <p:cSld>
-    <p:spTree>
-      <p:nvGrpSpPr>
-        <p:cNvPr id="1" name=""/>
-        <p:cNvGrpSpPr/>
-        <p:nvPr/>
-      </p:nvGrpSpPr>
-      <p:grpSpPr>
-        <a:xfrm>
-          <a:off x="0" y="0"/>
-          <a:ext cx="0" cy="0"/>
-          <a:chOff x="0" y="0"/>
-          <a:chExt cx="0" cy="0"/>
-        </a:xfrm>
-      </p:grpSpPr>
-      <p:sp>
-        <p:nvSpPr>
-          <p:cNvPr id="2" name="Title 1">
-            <a:extLst>
-              <a:ext uri="{FF2B5EF4-FFF2-40B4-BE49-F238E27FC236}">
-                <a16:creationId xmlns:a16="http://schemas.microsoft.com/office/drawing/2014/main" id="{9FCC93A9-1909-0944-9099-9A612E388F3E}"/>
-              </a:ext>
-            </a:extLst>
-          </p:cNvPr>
-          <p:cNvSpPr>
-            <a:spLocks noGrp="1"/>
-          </p:cNvSpPr>
-          <p:nvPr>
-            <p:ph type="title"/>
-          </p:nvPr>
-        </p:nvSpPr>
-        <p:spPr/>
-        <p:txBody>
-          <a:bodyPr/>
-          <a:lstStyle/>
-          <a:p>
-            <a:r>
-              <a:rPr lang="en-US" dirty="0"/>
-              <a:t>TCache Bins (Review)</a:t>
-            </a:r>
-          </a:p>
-        </p:txBody>
-      </p:sp>
-      <p:sp>
-        <p:nvSpPr>
-          <p:cNvPr id="3" name="Content Placeholder 2">
-            <a:extLst>
-              <a:ext uri="{FF2B5EF4-FFF2-40B4-BE49-F238E27FC236}">
-                <a16:creationId xmlns:a16="http://schemas.microsoft.com/office/drawing/2014/main" id="{2FF03EE8-B255-A142-84D0-A4B901FA6492}"/>
-              </a:ext>
-            </a:extLst>
-          </p:cNvPr>
-          <p:cNvSpPr>
-            <a:spLocks noGrp="1"/>
-          </p:cNvSpPr>
-          <p:nvPr>
-            <p:ph idx="1"/>
-          </p:nvPr>
-        </p:nvSpPr>
-        <p:spPr>
-          <a:xfrm>
-            <a:off x="628650" y="1236541"/>
-            <a:ext cx="4103148" cy="3726076"/>
-          </a:xfrm>
-        </p:spPr>
-        <p:txBody>
-          <a:bodyPr>
-            <a:normAutofit/>
-          </a:bodyPr>
-          <a:lstStyle/>
-          <a:p>
-            <a:r>
-              <a:rPr lang="en-US" dirty="0"/>
-              <a:t>Added in </a:t>
-            </a:r>
-            <a:r>
-              <a:rPr lang="en-US" dirty="0" err="1"/>
-              <a:t>GLibC</a:t>
-            </a:r>
-            <a:r>
-              <a:rPr lang="en-US" dirty="0"/>
-              <a:t> Malloc 2.26 (2018ish)</a:t>
-            </a:r>
-          </a:p>
-          <a:p>
-            <a:r>
-              <a:rPr lang="en-US" b="1" dirty="0"/>
-              <a:t>Thread Specific</a:t>
-            </a:r>
-            <a:r>
-              <a:rPr lang="en-US" dirty="0"/>
-              <a:t>:</a:t>
-            </a:r>
-          </a:p>
-          <a:p>
-            <a:pPr lvl="1"/>
-            <a:r>
-              <a:rPr lang="en-US" dirty="0"/>
-              <a:t>This allows for mutexes to not be required!</a:t>
-            </a:r>
-          </a:p>
-          <a:p>
-            <a:r>
-              <a:rPr lang="en-US" dirty="0"/>
-              <a:t>Properties: </a:t>
-            </a:r>
-          </a:p>
-          <a:p>
-            <a:pPr lvl="1"/>
-            <a:r>
-              <a:rPr lang="en-US" dirty="0"/>
-              <a:t>Each thread has 64 singly-linked TCache bins. </a:t>
-            </a:r>
-          </a:p>
-          <a:p>
-            <a:pPr lvl="1"/>
-            <a:r>
-              <a:rPr lang="en-US" dirty="0"/>
-              <a:t>Limit to 7 chunks per bin </a:t>
-            </a:r>
-          </a:p>
-          <a:p>
-            <a:pPr lvl="1"/>
-            <a:r>
-              <a:rPr lang="en-US" dirty="0"/>
-              <a:t>0x20 is smallest bin size</a:t>
-            </a:r>
-          </a:p>
-          <a:p>
-            <a:endParaRPr lang="en-US" dirty="0"/>
-          </a:p>
-          <a:p>
-            <a:pPr lvl="1"/>
-            <a:endParaRPr lang="en-US" dirty="0"/>
-          </a:p>
-          <a:p>
-            <a:endParaRPr lang="en-US" dirty="0"/>
-          </a:p>
-        </p:txBody>
-      </p:sp>
-    </p:spTree>
-    <p:extLst>
-      <p:ext uri="{BB962C8B-B14F-4D97-AF65-F5344CB8AC3E}">
-        <p14:creationId xmlns:p14="http://schemas.microsoft.com/office/powerpoint/2010/main" val="3131075558"/>
       </p:ext>
     </p:extLst>
   </p:cSld>
@@ -26543,7 +27752,7 @@
         </p:nvCxnSpPr>
         <p:spPr>
           <a:xfrm>
-            <a:off x="6494106" y="3645558"/>
+            <a:off x="6889126" y="4106415"/>
             <a:ext cx="1166326" cy="0"/>
           </a:xfrm>
           <a:prstGeom prst="line">
@@ -26702,7 +27911,7 @@
         </p:nvCxnSpPr>
         <p:spPr>
           <a:xfrm>
-            <a:off x="6494106" y="2706005"/>
+            <a:off x="6889126" y="3188809"/>
             <a:ext cx="1166326" cy="0"/>
           </a:xfrm>
           <a:prstGeom prst="line">

</xml_diff>